<commit_message>
feat: write image metadata format 적음
</commit_message>
<xml_diff>
--- a/layout.pptx
+++ b/layout.pptx
@@ -4758,7 +4758,7 @@
         </p:nvSpPr>
         <p:spPr>
           <a:xfrm>
-            <a:off x="7391400" y="1674725"/>
+            <a:off x="7391400" y="2047103"/>
             <a:ext cx="3600450" cy="372378"/>
           </a:xfrm>
           <a:prstGeom prst="roundRect">
@@ -4825,7 +4825,7 @@
         </p:nvSpPr>
         <p:spPr>
           <a:xfrm>
-            <a:off x="7391400" y="2162000"/>
+            <a:off x="7391400" y="2534378"/>
             <a:ext cx="3600450" cy="372378"/>
           </a:xfrm>
           <a:prstGeom prst="roundRect">
@@ -4887,7 +4887,7 @@
         </p:nvSpPr>
         <p:spPr>
           <a:xfrm>
-            <a:off x="7391400" y="2649275"/>
+            <a:off x="7391400" y="3021653"/>
             <a:ext cx="3600450" cy="1026836"/>
           </a:xfrm>
           <a:prstGeom prst="roundRect">
@@ -4955,6 +4955,132 @@
                 </a:solidFill>
               </a:rPr>
               <a:t>재밌었다</a:t>
+            </a:r>
+          </a:p>
+        </p:txBody>
+      </p:sp>
+      <p:sp>
+        <p:nvSpPr>
+          <p:cNvPr id="9" name="사각형: 둥근 모서리 8">
+            <a:extLst>
+              <a:ext uri="{FF2B5EF4-FFF2-40B4-BE49-F238E27FC236}">
+                <a16:creationId xmlns:a16="http://schemas.microsoft.com/office/drawing/2014/main" id="{4C408AED-3204-CFE6-F9A0-86DEDA324C39}"/>
+              </a:ext>
+            </a:extLst>
+          </p:cNvPr>
+          <p:cNvSpPr/>
+          <p:nvPr/>
+        </p:nvSpPr>
+        <p:spPr>
+          <a:xfrm>
+            <a:off x="7391400" y="1643646"/>
+            <a:ext cx="3600450" cy="372378"/>
+          </a:xfrm>
+          <a:prstGeom prst="roundRect">
+            <a:avLst>
+              <a:gd name="adj" fmla="val 0"/>
+            </a:avLst>
+          </a:prstGeom>
+          <a:solidFill>
+            <a:schemeClr val="bg1"/>
+          </a:solidFill>
+          <a:ln>
+            <a:solidFill>
+              <a:schemeClr val="tx1"/>
+            </a:solidFill>
+          </a:ln>
+        </p:spPr>
+        <p:style>
+          <a:lnRef idx="2">
+            <a:schemeClr val="accent1">
+              <a:shade val="15000"/>
+            </a:schemeClr>
+          </a:lnRef>
+          <a:fillRef idx="1">
+            <a:schemeClr val="accent1"/>
+          </a:fillRef>
+          <a:effectRef idx="0">
+            <a:schemeClr val="accent1"/>
+          </a:effectRef>
+          <a:fontRef idx="minor">
+            <a:schemeClr val="lt1"/>
+          </a:fontRef>
+        </p:style>
+        <p:txBody>
+          <a:bodyPr rtlCol="0" anchor="ctr"/>
+          <a:lstStyle/>
+          <a:p>
+            <a:r>
+              <a:rPr lang="en-US" altLang="ko-KR" dirty="0">
+                <a:solidFill>
+                  <a:schemeClr val="tx1"/>
+                </a:solidFill>
+              </a:rPr>
+              <a:t>SYST </a:t>
+            </a:r>
+            <a:r>
+              <a:rPr lang="ko-KR" altLang="en-US" dirty="0">
+                <a:solidFill>
+                  <a:schemeClr val="tx1"/>
+                </a:solidFill>
+              </a:rPr>
+              <a:t>방문</a:t>
+            </a:r>
+          </a:p>
+        </p:txBody>
+      </p:sp>
+      <p:sp>
+        <p:nvSpPr>
+          <p:cNvPr id="10" name="사각형: 둥근 모서리 9">
+            <a:extLst>
+              <a:ext uri="{FF2B5EF4-FFF2-40B4-BE49-F238E27FC236}">
+                <a16:creationId xmlns:a16="http://schemas.microsoft.com/office/drawing/2014/main" id="{7EC22575-F5AD-73CC-FFF1-1B5450D2CF92}"/>
+              </a:ext>
+            </a:extLst>
+          </p:cNvPr>
+          <p:cNvSpPr/>
+          <p:nvPr/>
+        </p:nvSpPr>
+        <p:spPr>
+          <a:xfrm>
+            <a:off x="7391400" y="4252331"/>
+            <a:ext cx="3600450" cy="372378"/>
+          </a:xfrm>
+          <a:prstGeom prst="roundRect">
+            <a:avLst>
+              <a:gd name="adj" fmla="val 0"/>
+            </a:avLst>
+          </a:prstGeom>
+          <a:solidFill>
+            <a:schemeClr val="bg2">
+              <a:lumMod val="25000"/>
+            </a:schemeClr>
+          </a:solidFill>
+        </p:spPr>
+        <p:style>
+          <a:lnRef idx="2">
+            <a:schemeClr val="accent1">
+              <a:shade val="15000"/>
+            </a:schemeClr>
+          </a:lnRef>
+          <a:fillRef idx="1">
+            <a:schemeClr val="accent1"/>
+          </a:fillRef>
+          <a:effectRef idx="0">
+            <a:schemeClr val="accent1"/>
+          </a:effectRef>
+          <a:fontRef idx="minor">
+            <a:schemeClr val="lt1"/>
+          </a:fontRef>
+        </p:style>
+        <p:txBody>
+          <a:bodyPr rtlCol="0" anchor="ctr"/>
+          <a:lstStyle/>
+          <a:p>
+            <a:pPr algn="ctr"/>
+            <a:r>
+              <a:rPr lang="ko-KR" altLang="en-US" dirty="0"/>
+              <a:t>업로드</a:t>
             </a:r>
           </a:p>
         </p:txBody>

</xml_diff>